<commit_message>
twee grafiekjes toegevoegd en probeersel presentatie
</commit_message>
<xml_diff>
--- a/presentation/20120719 vim workshop 7 sept.pptx
+++ b/presentation/20120719 vim workshop 7 sept.pptx
@@ -4,13 +4,15 @@
   <p:sldMasterIdLst>
     <p:sldMasterId id="2147483648" r:id="rId2"/>
     <p:sldMasterId id="2147483650" r:id="rId3"/>
+    <p:sldMasterId id="2147483652" r:id="rId4"/>
   </p:sldMasterIdLst>
   <p:notesMasterIdLst>
-    <p:notesMasterId r:id="rId4"/>
+    <p:notesMasterId r:id="rId5"/>
   </p:notesMasterIdLst>
   <p:sldIdLst>
-    <p:sldId id="256" r:id="rId5"/>
-    <p:sldId id="257" r:id="rId6"/>
+    <p:sldId id="256" r:id="rId6"/>
+    <p:sldId id="257" r:id="rId7"/>
+    <p:sldId id="258" r:id="rId8"/>
   </p:sldIdLst>
   <p:sldSz cx="9144000" cy="6858000"/>
   <p:notesSz cx="6858000" cy="9144000"/>
@@ -36,7 +38,7 @@
       </p:grpSpPr>
       <p:sp>
         <p:nvSpPr>
-          <p:cNvPr id="10" name="PlaceHolder 1"/>
+          <p:cNvPr id="13" name="PlaceHolder 1"/>
           <p:cNvSpPr>
             <a:spLocks noGrp="1"/>
           </p:cNvSpPr>
@@ -46,8 +48,8 @@
         </p:nvSpPr>
         <p:spPr>
           <a:xfrm>
-            <a:off x="756000" y="5078520"/>
-            <a:ext cx="6047640" cy="4811040"/>
+            <a:off x="1060920" y="4350240"/>
+            <a:ext cx="4741200" cy="3512880"/>
           </a:xfrm>
           <a:prstGeom prst="rect">
             <a:avLst/>
@@ -60,128 +62,6 @@
               <a:rPr lang="nl-NL"/>
               <a:t>Klik om het formaat van de notities te bewerken</a:t>
             </a:r>
-            <a:endParaRPr/>
-          </a:p>
-        </p:txBody>
-      </p:sp>
-      <p:sp>
-        <p:nvSpPr>
-          <p:cNvPr id="11" name="PlaceHolder 2"/>
-          <p:cNvSpPr>
-            <a:spLocks noGrp="1"/>
-          </p:cNvSpPr>
-          <p:nvPr>
-            <p:ph type="hdr"/>
-          </p:nvPr>
-        </p:nvSpPr>
-        <p:spPr>
-          <a:xfrm>
-            <a:off x="0" y="0"/>
-            <a:ext cx="3280680" cy="534240"/>
-          </a:xfrm>
-          <a:prstGeom prst="rect">
-            <a:avLst/>
-          </a:prstGeom>
-        </p:spPr>
-        <p:txBody>
-          <a:bodyPr bIns="0" lIns="0" rIns="0" tIns="0" wrap="none"/>
-          <a:p>
-            <a:r>
-              <a:rPr lang="nl-NL"/>
-              <a:t>&lt;koptekst&gt;</a:t>
-            </a:r>
-            <a:endParaRPr/>
-          </a:p>
-        </p:txBody>
-      </p:sp>
-      <p:sp>
-        <p:nvSpPr>
-          <p:cNvPr id="12" name="PlaceHolder 3"/>
-          <p:cNvSpPr>
-            <a:spLocks noGrp="1"/>
-          </p:cNvSpPr>
-          <p:nvPr>
-            <p:ph type="dt"/>
-          </p:nvPr>
-        </p:nvSpPr>
-        <p:spPr>
-          <a:xfrm>
-            <a:off x="4278960" y="0"/>
-            <a:ext cx="3280680" cy="534240"/>
-          </a:xfrm>
-          <a:prstGeom prst="rect">
-            <a:avLst/>
-          </a:prstGeom>
-        </p:spPr>
-        <p:txBody>
-          <a:bodyPr bIns="0" lIns="0" rIns="0" tIns="0" wrap="none"/>
-          <a:p>
-            <a:pPr algn="r"/>
-            <a:r>
-              <a:rPr lang="nl-NL"/>
-              <a:t>&lt;datum/tijd&gt;</a:t>
-            </a:r>
-            <a:endParaRPr/>
-          </a:p>
-        </p:txBody>
-      </p:sp>
-      <p:sp>
-        <p:nvSpPr>
-          <p:cNvPr id="13" name="PlaceHolder 4"/>
-          <p:cNvSpPr>
-            <a:spLocks noGrp="1"/>
-          </p:cNvSpPr>
-          <p:nvPr>
-            <p:ph type="ftr"/>
-          </p:nvPr>
-        </p:nvSpPr>
-        <p:spPr>
-          <a:xfrm>
-            <a:off x="0" y="10157400"/>
-            <a:ext cx="3280680" cy="534240"/>
-          </a:xfrm>
-          <a:prstGeom prst="rect">
-            <a:avLst/>
-          </a:prstGeom>
-        </p:spPr>
-        <p:txBody>
-          <a:bodyPr anchor="b" bIns="0" lIns="0" rIns="0" tIns="0" wrap="none"/>
-          <a:p>
-            <a:r>
-              <a:rPr lang="nl-NL"/>
-              <a:t>&lt;voettekst&gt;</a:t>
-            </a:r>
-            <a:endParaRPr/>
-          </a:p>
-        </p:txBody>
-      </p:sp>
-      <p:sp>
-        <p:nvSpPr>
-          <p:cNvPr id="14" name="PlaceHolder 5"/>
-          <p:cNvSpPr>
-            <a:spLocks noGrp="1"/>
-          </p:cNvSpPr>
-          <p:nvPr>
-            <p:ph type="sldNum"/>
-          </p:nvPr>
-        </p:nvSpPr>
-        <p:spPr>
-          <a:xfrm>
-            <a:off x="4278960" y="10157400"/>
-            <a:ext cx="3280680" cy="534240"/>
-          </a:xfrm>
-          <a:prstGeom prst="rect">
-            <a:avLst/>
-          </a:prstGeom>
-        </p:spPr>
-        <p:txBody>
-          <a:bodyPr anchor="b" bIns="0" lIns="0" rIns="0" tIns="0" wrap="none"/>
-          <a:p>
-            <a:pPr algn="r"/>
-            <a:fld id="{8161A181-41C1-41E1-9191-31615101E151}" type="slidenum">
-              <a:rPr lang="nl-NL"/>
-              <a:t>&lt;getal&gt;</a:t>
-            </a:fld>
             <a:endParaRPr/>
           </a:p>
         </p:txBody>
@@ -211,7 +91,7 @@
       </p:grpSpPr>
       <p:sp>
         <p:nvSpPr>
-          <p:cNvPr id="19" name="PlaceHolder 1"/>
+          <p:cNvPr id="20" name="PlaceHolder 1"/>
           <p:cNvSpPr>
             <a:spLocks noGrp="1"/>
           </p:cNvSpPr>
@@ -221,8 +101,8 @@
         </p:nvSpPr>
         <p:spPr>
           <a:xfrm>
-            <a:off x="0" y="0"/>
-            <a:ext cx="360" cy="360"/>
+            <a:off x="1060920" y="4350240"/>
+            <a:ext cx="4741200" cy="3512880"/>
           </a:xfrm>
           <a:prstGeom prst="rect">
             <a:avLst/>
@@ -231,7 +111,7 @@
       </p:sp>
       <p:sp>
         <p:nvSpPr>
-          <p:cNvPr id="20" name="TextShape 2"/>
+          <p:cNvPr id="21" name="TextShape 2"/>
           <p:cNvSpPr txBox="1"/>
           <p:nvPr/>
         </p:nvSpPr>
@@ -247,7 +127,7 @@
         <p:txBody>
           <a:bodyPr bIns="45000" lIns="90000" rIns="90000" tIns="45000"/>
           <a:p>
-            <a:fld id="{0141E171-61E1-4111-B1B1-8191C1C111B1}" type="slidenum">
+            <a:fld id="{71E1C161-2191-41A1-9161-D1A131D111A1}" type="slidenum">
               <a:rPr lang="nl-NL">
                 <a:solidFill>
                   <a:srgbClr val="000000"/>
@@ -285,7 +165,7 @@
       </p:grpSpPr>
       <p:sp>
         <p:nvSpPr>
-          <p:cNvPr id="21" name="PlaceHolder 1"/>
+          <p:cNvPr id="22" name="PlaceHolder 1"/>
           <p:cNvSpPr>
             <a:spLocks noGrp="1"/>
           </p:cNvSpPr>
@@ -295,8 +175,8 @@
         </p:nvSpPr>
         <p:spPr>
           <a:xfrm>
-            <a:off x="0" y="0"/>
-            <a:ext cx="360" cy="360"/>
+            <a:off x="1060920" y="4350240"/>
+            <a:ext cx="4741200" cy="3512880"/>
           </a:xfrm>
           <a:prstGeom prst="rect">
             <a:avLst/>
@@ -305,7 +185,7 @@
       </p:sp>
       <p:sp>
         <p:nvSpPr>
-          <p:cNvPr id="22" name="TextShape 2"/>
+          <p:cNvPr id="23" name="TextShape 2"/>
           <p:cNvSpPr txBox="1"/>
           <p:nvPr/>
         </p:nvSpPr>
@@ -321,7 +201,7 @@
         <p:txBody>
           <a:bodyPr bIns="45000" lIns="90000" rIns="90000" tIns="45000"/>
           <a:p>
-            <a:fld id="{F1319191-3101-4171-B161-01616181F1F1}" type="slidenum">
+            <a:fld id="{41A12121-6131-4141-B131-D1311191D131}" type="slidenum">
               <a:rPr lang="nl-NL">
                 <a:solidFill>
                   <a:srgbClr val="000000"/>
@@ -363,6 +243,50 @@
 </file>
 
 <file path=ppt/slideLayouts/slideLayout2.xml><?xml version="1.0" encoding="utf-8"?>
+<p:sldLayout xmlns:a="http://schemas.openxmlformats.org/drawingml/2006/main" xmlns:p="http://schemas.openxmlformats.org/presentationml/2006/main" xmlns:r="http://schemas.openxmlformats.org/officeDocument/2006/relationships" preserve="1" type="title">
+  <p:cSld name="Title Slide">
+    <p:spTree>
+      <p:nvGrpSpPr>
+        <p:cNvPr id="1" name=""/>
+        <p:cNvGrpSpPr/>
+        <p:nvPr/>
+      </p:nvGrpSpPr>
+      <p:grpSpPr>
+        <a:xfrm>
+          <a:off x="0" y="0"/>
+          <a:ext cx="0" cy="0"/>
+          <a:chOff x="0" y="0"/>
+          <a:chExt cx="0" cy="0"/>
+        </a:xfrm>
+      </p:grpSpPr>
+    </p:spTree>
+  </p:cSld>
+</p:sldLayout>
+</file>
+
+<file path=ppt/slideLayouts/slideLayout3.xml><?xml version="1.0" encoding="utf-8"?>
+<p:sldLayout xmlns:a="http://schemas.openxmlformats.org/drawingml/2006/main" xmlns:p="http://schemas.openxmlformats.org/presentationml/2006/main" xmlns:r="http://schemas.openxmlformats.org/officeDocument/2006/relationships" preserve="1" type="title">
+  <p:cSld name="Title Slide">
+    <p:spTree>
+      <p:nvGrpSpPr>
+        <p:cNvPr id="1" name=""/>
+        <p:cNvGrpSpPr/>
+        <p:nvPr/>
+      </p:nvGrpSpPr>
+      <p:grpSpPr>
+        <a:xfrm>
+          <a:off x="0" y="0"/>
+          <a:ext cx="0" cy="0"/>
+          <a:chOff x="0" y="0"/>
+          <a:chExt cx="0" cy="0"/>
+        </a:xfrm>
+      </p:grpSpPr>
+    </p:spTree>
+  </p:cSld>
+</p:sldLayout>
+</file>
+
+<file path=ppt/slideLayouts/slideLayout4.xml><?xml version="1.0" encoding="utf-8"?>
 <p:sldLayout xmlns:a="http://schemas.openxmlformats.org/drawingml/2006/main" xmlns:p="http://schemas.openxmlformats.org/presentationml/2006/main" xmlns:r="http://schemas.openxmlformats.org/officeDocument/2006/relationships" preserve="1" type="title">
   <p:cSld name="Title Slide">
     <p:spTree>
@@ -754,7 +678,7 @@
         <p:txBody>
           <a:bodyPr bIns="45000" lIns="90000" rIns="90000" tIns="45000"/>
           <a:p>
-            <a:fld id="{B1A16111-6151-41B1-9141-71A1B111D191}" type="slidenum">
+            <a:fld id="{B121E1C1-F1E1-41C1-8151-71712181A151}" type="slidenum">
               <a:rPr lang="nl-NL" sz="1200">
                 <a:solidFill>
                   <a:srgbClr val="8b8b8b"/>
@@ -866,7 +790,7 @@
         <p:txBody>
           <a:bodyPr bIns="45000" lIns="90000" rIns="90000" tIns="45000"/>
           <a:p>
-            <a:fld id="{F19191F1-01A1-4161-B1E1-51B151C1F1E1}" type="slidenum">
+            <a:fld id="{81B12171-B191-4141-81D1-6181D141A1E1}" type="slidenum">
               <a:rPr lang="nl-NL" sz="1200">
                 <a:solidFill>
                   <a:srgbClr val="8b8b8b"/>
@@ -1049,6 +973,224 @@
 </p:sldMaster>
 </file>
 
+<file path=ppt/slideMasters/slideMaster3.xml><?xml version="1.0" encoding="utf-8"?>
+<p:sldMaster xmlns:a="http://schemas.openxmlformats.org/drawingml/2006/main" xmlns:p="http://schemas.openxmlformats.org/presentationml/2006/main" xmlns:r="http://schemas.openxmlformats.org/officeDocument/2006/relationships">
+  <p:cSld>
+    <p:bg>
+      <p:bgPr>
+        <a:solidFill>
+          <a:srgbClr val="333366"/>
+        </a:solidFill>
+      </p:bgPr>
+    </p:bg>
+    <p:spTree>
+      <p:nvGrpSpPr>
+        <p:cNvPr id="1" name=""/>
+        <p:cNvGrpSpPr/>
+        <p:nvPr/>
+      </p:nvGrpSpPr>
+      <p:grpSpPr>
+        <a:xfrm>
+          <a:off x="0" y="0"/>
+          <a:ext cx="0" cy="0"/>
+          <a:chOff x="0" y="0"/>
+          <a:chExt cx="0" cy="0"/>
+        </a:xfrm>
+      </p:grpSpPr>
+      <p:sp>
+        <p:nvSpPr>
+          <p:cNvPr id="10" name="PlaceHolder 1"/>
+          <p:cNvSpPr>
+            <a:spLocks noGrp="1"/>
+          </p:cNvSpPr>
+          <p:nvPr>
+            <p:ph type="title"/>
+          </p:nvPr>
+        </p:nvSpPr>
+        <p:spPr>
+          <a:xfrm>
+            <a:off x="671760" y="105840"/>
+            <a:ext cx="7809120" cy="1145160"/>
+          </a:xfrm>
+          <a:prstGeom prst="rect">
+            <a:avLst/>
+          </a:prstGeom>
+        </p:spPr>
+        <p:txBody>
+          <a:bodyPr anchor="ctr" bIns="0" lIns="0" rIns="0" tIns="0" wrap="none"/>
+          <a:p>
+            <a:pPr algn="ctr"/>
+            <a:r>
+              <a:rPr lang="nl-NL"/>
+              <a:t>Klik om de opmaak van de titeltekst te bewerken</a:t>
+            </a:r>
+            <a:endParaRPr/>
+          </a:p>
+        </p:txBody>
+      </p:sp>
+      <p:sp>
+        <p:nvSpPr>
+          <p:cNvPr id="11" name="PlaceHolder 2"/>
+          <p:cNvSpPr>
+            <a:spLocks noGrp="1"/>
+          </p:cNvSpPr>
+          <p:nvPr>
+            <p:ph type="body"/>
+          </p:nvPr>
+        </p:nvSpPr>
+        <p:spPr>
+          <a:xfrm>
+            <a:off x="987120" y="2017440"/>
+            <a:ext cx="7690320" cy="4526280"/>
+          </a:xfrm>
+          <a:prstGeom prst="rect">
+            <a:avLst/>
+          </a:prstGeom>
+        </p:spPr>
+        <p:txBody>
+          <a:bodyPr bIns="0" lIns="0" rIns="0" tIns="0" wrap="none"/>
+          <a:p>
+            <a:pPr>
+              <a:buSzPct val="75000"/>
+              <a:buFont typeface="StarSymbol"/>
+              <a:buChar char="➲"/>
+            </a:pPr>
+            <a:r>
+              <a:rPr lang="nl-NL"/>
+              <a:t>Klik om de opmaak van de overzichtstekst te bewerken</a:t>
+            </a:r>
+            <a:endParaRPr/>
+          </a:p>
+          <a:p>
+            <a:pPr lvl="1">
+              <a:buSzPct val="75000"/>
+              <a:buFont typeface="StarSymbol"/>
+              <a:buChar char=""/>
+            </a:pPr>
+            <a:r>
+              <a:rPr lang="nl-NL"/>
+              <a:t>Tweede overzichtsniveau</a:t>
+            </a:r>
+            <a:endParaRPr/>
+          </a:p>
+          <a:p>
+            <a:pPr lvl="2">
+              <a:buSzPct val="75000"/>
+              <a:buFont typeface="StarSymbol"/>
+              <a:buChar char=""/>
+            </a:pPr>
+            <a:r>
+              <a:rPr lang="nl-NL"/>
+              <a:t>Derde overzichtsniveau</a:t>
+            </a:r>
+            <a:endParaRPr/>
+          </a:p>
+          <a:p>
+            <a:pPr lvl="3">
+              <a:buSzPct val="75000"/>
+              <a:buFont typeface="StarSymbol"/>
+              <a:buChar char=""/>
+            </a:pPr>
+            <a:r>
+              <a:rPr lang="nl-NL"/>
+              <a:t>Vierde overzichtsniveau</a:t>
+            </a:r>
+            <a:endParaRPr/>
+          </a:p>
+          <a:p>
+            <a:pPr lvl="4">
+              <a:buSzPct val="75000"/>
+              <a:buFont typeface="StarSymbol"/>
+              <a:buChar char=""/>
+            </a:pPr>
+            <a:r>
+              <a:rPr lang="nl-NL"/>
+              <a:t>Vijfde overzichtsniveau</a:t>
+            </a:r>
+            <a:endParaRPr/>
+          </a:p>
+          <a:p>
+            <a:pPr lvl="5">
+              <a:buSzPct val="75000"/>
+              <a:buFont typeface="StarSymbol"/>
+              <a:buChar char=""/>
+            </a:pPr>
+            <a:r>
+              <a:rPr lang="nl-NL"/>
+              <a:t>Zesde overzichtsniveau</a:t>
+            </a:r>
+            <a:endParaRPr/>
+          </a:p>
+          <a:p>
+            <a:pPr lvl="6">
+              <a:buSzPct val="75000"/>
+              <a:buFont typeface="StarSymbol"/>
+              <a:buChar char=""/>
+            </a:pPr>
+            <a:r>
+              <a:rPr lang="nl-NL"/>
+              <a:t>Zevende overzichtsniveau</a:t>
+            </a:r>
+            <a:endParaRPr/>
+          </a:p>
+          <a:p>
+            <a:pPr lvl="7">
+              <a:buSzPct val="75000"/>
+              <a:buFont typeface="StarSymbol"/>
+              <a:buChar char=""/>
+            </a:pPr>
+            <a:r>
+              <a:rPr lang="nl-NL"/>
+              <a:t>Achtste overzichtsniveau</a:t>
+            </a:r>
+            <a:endParaRPr/>
+          </a:p>
+          <a:p>
+            <a:pPr lvl="8">
+              <a:buSzPct val="75000"/>
+              <a:buFont typeface="StarSymbol"/>
+              <a:buChar char=""/>
+            </a:pPr>
+            <a:r>
+              <a:rPr lang="nl-NL"/>
+              <a:t>Negende overzichtsniveau</a:t>
+            </a:r>
+            <a:endParaRPr/>
+          </a:p>
+        </p:txBody>
+      </p:sp>
+      <p:pic>
+        <p:nvPicPr>
+          <p:cNvPr descr="" id="12" name=""/>
+          <p:cNvPicPr/>
+          <p:nvPr/>
+        </p:nvPicPr>
+        <p:blipFill>
+          <a:blip r:embed="rId2"/>
+          <a:stretch>
+            <a:fillRect/>
+          </a:stretch>
+        </p:blipFill>
+        <p:spPr>
+          <a:xfrm>
+            <a:off x="7200000" y="5670720"/>
+            <a:ext cx="1786680" cy="959400"/>
+          </a:xfrm>
+          <a:prstGeom prst="rect">
+            <a:avLst/>
+          </a:prstGeom>
+        </p:spPr>
+      </p:pic>
+    </p:spTree>
+  </p:cSld>
+  <p:clrMap accent1="accent1" accent2="accent2" accent3="accent3" accent4="accent4" accent5="accent5" accent6="accent6" bg1="lt1" bg2="lt2" folHlink="folHlink" hlink="hlink" tx1="dk1" tx2="dk2"/>
+  <p:sldLayoutIdLst>
+    <p:sldLayoutId id="2147483653" r:id="rId3"/>
+    <p:sldLayoutId id="2147483654" r:id="rId4"/>
+  </p:sldLayoutIdLst>
+</p:sldMaster>
+</file>
+
 <file path=ppt/slides/slide1.xml><?xml version="1.0" encoding="utf-8"?>
 <p:sld xmlns:a="http://schemas.openxmlformats.org/drawingml/2006/main" xmlns:p="http://schemas.openxmlformats.org/presentationml/2006/main" xmlns:r="http://schemas.openxmlformats.org/officeDocument/2006/relationships">
   <p:cSld>
@@ -1068,7 +1210,7 @@
       </p:grpSpPr>
       <p:pic>
         <p:nvPicPr>
-          <p:cNvPr descr="" id="15" name="Picture 1"/>
+          <p:cNvPr descr="" id="14" name="Picture 1"/>
           <p:cNvPicPr/>
           <p:nvPr/>
         </p:nvPicPr>
@@ -1090,7 +1232,7 @@
       </p:pic>
       <p:pic>
         <p:nvPicPr>
-          <p:cNvPr descr="" id="16" name="Picture 2"/>
+          <p:cNvPr descr="" id="15" name="Picture 2"/>
           <p:cNvPicPr/>
           <p:nvPr/>
         </p:nvPicPr>
@@ -1137,7 +1279,7 @@
       </p:grpSpPr>
       <p:sp>
         <p:nvSpPr>
-          <p:cNvPr id="17" name="CustomShape 1"/>
+          <p:cNvPr id="16" name="CustomShape 1"/>
           <p:cNvSpPr/>
           <p:nvPr/>
         </p:nvSpPr>
@@ -1169,7 +1311,7 @@
       </p:sp>
       <p:pic>
         <p:nvPicPr>
-          <p:cNvPr descr="" id="18" name=""/>
+          <p:cNvPr descr="" id="17" name=""/>
           <p:cNvPicPr/>
           <p:nvPr/>
         </p:nvPicPr>
@@ -1201,6 +1343,145 @@
           <p:childTnLst>
             <p:seq>
               <p:cTn id="2" nodeType="mainSeq">
+                <p:childTnLst/>
+              </p:cTn>
+              <p:prevCondLst>
+                <p:cond delay="0" evt="onPrev">
+                  <p:tgtEl>
+                    <p:sldTgt/>
+                  </p:tgtEl>
+                </p:cond>
+              </p:prevCondLst>
+              <p:nextCondLst>
+                <p:cond delay="0" evt="onNext">
+                  <p:tgtEl>
+                    <p:sldTgt/>
+                  </p:tgtEl>
+                </p:cond>
+              </p:nextCondLst>
+            </p:seq>
+          </p:childTnLst>
+        </p:cTn>
+      </p:par>
+    </p:tnLst>
+  </p:timing>
+</p:sld>
+</file>
+
+<file path=ppt/slides/slide3.xml><?xml version="1.0" encoding="utf-8"?>
+<p:sld xmlns:a="http://schemas.openxmlformats.org/drawingml/2006/main" xmlns:p="http://schemas.openxmlformats.org/presentationml/2006/main" xmlns:r="http://schemas.openxmlformats.org/officeDocument/2006/relationships">
+  <p:cSld>
+    <p:spTree>
+      <p:nvGrpSpPr>
+        <p:cNvPr id="1" name=""/>
+        <p:cNvGrpSpPr/>
+        <p:nvPr/>
+      </p:nvGrpSpPr>
+      <p:grpSpPr>
+        <a:xfrm>
+          <a:off x="0" y="0"/>
+          <a:ext cx="0" cy="0"/>
+          <a:chOff x="0" y="0"/>
+          <a:chExt cx="0" cy="0"/>
+        </a:xfrm>
+      </p:grpSpPr>
+      <p:sp>
+        <p:nvSpPr>
+          <p:cNvPr id="18" name="TextShape 1"/>
+          <p:cNvSpPr txBox="1"/>
+          <p:nvPr/>
+        </p:nvSpPr>
+        <p:spPr>
+          <a:xfrm>
+            <a:off x="671760" y="105840"/>
+            <a:ext cx="7809120" cy="1145520"/>
+          </a:xfrm>
+          <a:prstGeom prst="rect">
+            <a:avLst/>
+          </a:prstGeom>
+        </p:spPr>
+        <p:txBody>
+          <a:bodyPr anchor="ctr" bIns="0" lIns="0" rIns="0" tIns="0" wrap="none"/>
+          <a:p>
+            <a:pPr algn="ctr"/>
+            <a:r>
+              <a:rPr lang="nl-NL"/>
+              <a:t>Vim Workshop</a:t>
+            </a:r>
+            <a:endParaRPr/>
+          </a:p>
+        </p:txBody>
+      </p:sp>
+      <p:sp>
+        <p:nvSpPr>
+          <p:cNvPr id="19" name="TextShape 2"/>
+          <p:cNvSpPr txBox="1"/>
+          <p:nvPr/>
+        </p:nvSpPr>
+        <p:spPr>
+          <a:xfrm>
+            <a:off x="987120" y="2017440"/>
+            <a:ext cx="7690320" cy="4526280"/>
+          </a:xfrm>
+          <a:prstGeom prst="rect">
+            <a:avLst/>
+          </a:prstGeom>
+        </p:spPr>
+        <p:txBody>
+          <a:bodyPr bIns="0" lIns="0" rIns="0" tIns="0" wrap="none"/>
+          <a:p>
+            <a:pPr>
+              <a:buSzPct val="75000"/>
+              <a:buFont typeface="StarSymbol"/>
+              <a:buChar char="➲"/>
+            </a:pPr>
+            <a:r>
+              <a:rPr lang="nl-NL"/>
+              <a:t>Telefoons stil ajb</a:t>
+            </a:r>
+            <a:endParaRPr/>
+          </a:p>
+          <a:p>
+            <a:pPr>
+              <a:buSzPct val="75000"/>
+              <a:buFont typeface="StarSymbol"/>
+              <a:buChar char="➲"/>
+            </a:pPr>
+            <a:r>
+              <a:rPr lang="nl-NL"/>
+              <a:t>to vim or not to vim?</a:t>
+            </a:r>
+            <a:endParaRPr/>
+          </a:p>
+          <a:p>
+            <a:pPr>
+              <a:buSzPct val="75000"/>
+              <a:buFont typeface="StarSymbol"/>
+              <a:buChar char="➲"/>
+            </a:pPr>
+            <a:r>
+              <a:rPr lang="nl-NL"/>
+              <a:t>laptops =&gt; usb sticks =&gt; files</a:t>
+            </a:r>
+            <a:endParaRPr/>
+          </a:p>
+          <a:p>
+            <a:endParaRPr/>
+          </a:p>
+        </p:txBody>
+      </p:sp>
+    </p:spTree>
+  </p:cSld>
+  <p:transition>
+    <p:fade/>
+  </p:transition>
+  <p:timing>
+    <p:tnLst>
+      <p:par>
+        <p:cTn dur="indefinite" id="3" nodeType="tmRoot" restart="never">
+          <p:childTnLst>
+            <p:seq>
+              <p:cTn id="4" nodeType="mainSeq">
                 <p:childTnLst/>
               </p:cTn>
               <p:prevCondLst>
@@ -1893,4 +2174,227 @@
     </a:fmtScheme>
   </a:themeElements>
 </a:theme>
+</file>
+
+<file path=ppt/theme/theme4.xml><?xml version="1.0" encoding="utf-8"?>
+<a:theme xmlns:a="http://schemas.openxmlformats.org/drawingml/2006/main" name="Office Theme">
+  <a:themeElements>
+    <a:clrScheme name="Office">
+      <a:dk1>
+        <a:sysClr val="windowText" lastClr="000000"/>
+      </a:dk1>
+      <a:lt1>
+        <a:sysClr val="window" lastClr="FFFFFF"/>
+      </a:lt1>
+      <a:dk2>
+        <a:srgbClr val="1F497D"/>
+      </a:dk2>
+      <a:lt2>
+        <a:srgbClr val="EEECE1"/>
+      </a:lt2>
+      <a:accent1>
+        <a:srgbClr val="4F81BD"/>
+      </a:accent1>
+      <a:accent2>
+        <a:srgbClr val="C0504D"/>
+      </a:accent2>
+      <a:accent3>
+        <a:srgbClr val="9BBB59"/>
+      </a:accent3>
+      <a:accent4>
+        <a:srgbClr val="8064A2"/>
+      </a:accent4>
+      <a:accent5>
+        <a:srgbClr val="4BACC6"/>
+      </a:accent5>
+      <a:accent6>
+        <a:srgbClr val="F79646"/>
+      </a:accent6>
+      <a:hlink>
+        <a:srgbClr val="0000FF"/>
+      </a:hlink>
+      <a:folHlink>
+        <a:srgbClr val="800080"/>
+      </a:folHlink>
+    </a:clrScheme>
+    <a:fontScheme name="Office">
+      <a:majorFont>
+        <a:latin typeface="Arial"/>
+        <a:ea typeface="DejaVu Sans"/>
+        <a:cs typeface="DejaVu Sans"/>
+      </a:majorFont>
+      <a:minorFont>
+        <a:latin typeface="Arial"/>
+        <a:ea typeface="DejaVu Sans"/>
+        <a:cs typeface="DejaVu Sans"/>
+      </a:minorFont>
+    </a:fontScheme>
+    <a:fmtScheme name="Office">
+      <a:fillStyleLst>
+        <a:solidFill>
+          <a:schemeClr val="phClr"/>
+        </a:solidFill>
+        <a:gradFill rotWithShape="1">
+          <a:gsLst>
+            <a:gs pos="0">
+              <a:schemeClr val="phClr">
+                <a:tint val="50000"/>
+                <a:satMod val="300000"/>
+              </a:schemeClr>
+            </a:gs>
+            <a:gs pos="35000">
+              <a:schemeClr val="phClr">
+                <a:tint val="37000"/>
+                <a:satMod val="300000"/>
+              </a:schemeClr>
+            </a:gs>
+            <a:gs pos="100000">
+              <a:schemeClr val="phClr">
+                <a:tint val="15000"/>
+                <a:satMod val="350000"/>
+              </a:schemeClr>
+            </a:gs>
+          </a:gsLst>
+          <a:lin ang="16200000" scaled="1"/>
+        </a:gradFill>
+        <a:gradFill rotWithShape="1">
+          <a:gsLst>
+            <a:gs pos="0">
+              <a:schemeClr val="phClr">
+                <a:shade val="51000"/>
+                <a:satMod val="130000"/>
+              </a:schemeClr>
+            </a:gs>
+            <a:gs pos="80000">
+              <a:schemeClr val="phClr">
+                <a:shade val="93000"/>
+                <a:satMod val="130000"/>
+              </a:schemeClr>
+            </a:gs>
+            <a:gs pos="100000">
+              <a:schemeClr val="phClr">
+                <a:shade val="94000"/>
+                <a:satMod val="135000"/>
+              </a:schemeClr>
+            </a:gs>
+          </a:gsLst>
+          <a:lin ang="16200000" scaled="0"/>
+        </a:gradFill>
+      </a:fillStyleLst>
+      <a:lnStyleLst>
+        <a:ln w="9525" cap="flat" cmpd="sng" algn="ctr">
+          <a:solidFill>
+            <a:schemeClr val="phClr">
+              <a:shade val="95000"/>
+              <a:satMod val="105000"/>
+            </a:schemeClr>
+          </a:solidFill>
+          <a:prstDash val="solid"/>
+        </a:ln>
+        <a:ln w="25400" cap="flat" cmpd="sng" algn="ctr">
+          <a:solidFill>
+            <a:schemeClr val="phClr"/>
+          </a:solidFill>
+          <a:prstDash val="solid"/>
+        </a:ln>
+        <a:ln w="38100" cap="flat" cmpd="sng" algn="ctr">
+          <a:solidFill>
+            <a:schemeClr val="phClr"/>
+          </a:solidFill>
+          <a:prstDash val="solid"/>
+        </a:ln>
+      </a:lnStyleLst>
+      <a:effectStyleLst>
+        <a:effectStyle>
+          <a:effectLst>
+            <a:outerShdw blurRad="40000" dist="20000" dir="5400000" rotWithShape="0">
+              <a:srgbClr val="000000">
+                <a:alpha val="38000"/>
+              </a:srgbClr>
+            </a:outerShdw>
+          </a:effectLst>
+        </a:effectStyle>
+        <a:effectStyle>
+          <a:effectLst>
+            <a:outerShdw blurRad="40000" dist="23000" dir="5400000" rotWithShape="0">
+              <a:srgbClr val="000000">
+                <a:alpha val="35000"/>
+              </a:srgbClr>
+            </a:outerShdw>
+          </a:effectLst>
+        </a:effectStyle>
+        <a:effectStyle>
+          <a:effectLst>
+            <a:outerShdw blurRad="40000" dist="23000" dir="5400000" rotWithShape="0">
+              <a:srgbClr val="000000">
+                <a:alpha val="35000"/>
+              </a:srgbClr>
+            </a:outerShdw>
+          </a:effectLst>
+          <a:scene3d>
+            <a:camera prst="orthographicFront">
+              <a:rot lat="0" lon="0" rev="0"/>
+            </a:camera>
+            <a:lightRig rig="threePt" dir="t">
+              <a:rot lat="0" lon="0" rev="1200000"/>
+            </a:lightRig>
+          </a:scene3d>
+          <a:sp3d>
+            <a:bevelT w="63500" h="25400"/>
+          </a:sp3d>
+        </a:effectStyle>
+      </a:effectStyleLst>
+      <a:bgFillStyleLst>
+        <a:solidFill>
+          <a:schemeClr val="phClr"/>
+        </a:solidFill>
+        <a:gradFill rotWithShape="1">
+          <a:gsLst>
+            <a:gs pos="0">
+              <a:schemeClr val="phClr">
+                <a:tint val="40000"/>
+                <a:satMod val="350000"/>
+              </a:schemeClr>
+            </a:gs>
+            <a:gs pos="40000">
+              <a:schemeClr val="phClr">
+                <a:tint val="45000"/>
+                <a:shade val="99000"/>
+                <a:satMod val="350000"/>
+              </a:schemeClr>
+            </a:gs>
+            <a:gs pos="100000">
+              <a:schemeClr val="phClr">
+                <a:shade val="20000"/>
+                <a:satMod val="255000"/>
+              </a:schemeClr>
+            </a:gs>
+          </a:gsLst>
+          <a:path path="circle">
+            <a:fillToRect l="50000" t="-80000" r="50000" b="180000"/>
+          </a:path>
+        </a:gradFill>
+        <a:gradFill rotWithShape="1">
+          <a:gsLst>
+            <a:gs pos="0">
+              <a:schemeClr val="phClr">
+                <a:tint val="80000"/>
+                <a:satMod val="300000"/>
+              </a:schemeClr>
+            </a:gs>
+            <a:gs pos="100000">
+              <a:schemeClr val="phClr">
+                <a:shade val="30000"/>
+                <a:satMod val="200000"/>
+              </a:schemeClr>
+            </a:gs>
+          </a:gsLst>
+          <a:path path="circle">
+            <a:fillToRect l="50000" t="50000" r="50000" b="50000"/>
+          </a:path>
+        </a:gradFill>
+      </a:bgFillStyleLst>
+    </a:fmtScheme>
+  </a:themeElements>
+</a:theme>
 </file>
</xml_diff>